<commit_message>
model outputs summary and r_mu dictionary
</commit_message>
<xml_diff>
--- a/Summary/20220511_microbiome_demographic_slides.pptx
+++ b/Summary/20220511_microbiome_demographic_slides.pptx
@@ -145,7 +145,7 @@
   <pc:docChgLst>
     <pc:chgData name="Jonathan Mah" userId="5261b2f2f3e51194" providerId="LiveId" clId="{B3B2E634-BB47-48CF-AE9B-407E2F869F6C}"/>
     <pc:docChg chg="custSel addSld delSld modSld modSection">
-      <pc:chgData name="Jonathan Mah" userId="5261b2f2f3e51194" providerId="LiveId" clId="{B3B2E634-BB47-48CF-AE9B-407E2F869F6C}" dt="2022-05-11T21:43:28.802" v="138"/>
+      <pc:chgData name="Jonathan Mah" userId="5261b2f2f3e51194" providerId="LiveId" clId="{B3B2E634-BB47-48CF-AE9B-407E2F869F6C}" dt="2022-05-11T22:57:02.211" v="141" actId="1076"/>
       <pc:docMkLst>
         <pc:docMk/>
       </pc:docMkLst>
@@ -165,7 +165,7 @@
         </pc:spChg>
       </pc:sldChg>
       <pc:sldChg chg="addSp delSp modSp add mod">
-        <pc:chgData name="Jonathan Mah" userId="5261b2f2f3e51194" providerId="LiveId" clId="{B3B2E634-BB47-48CF-AE9B-407E2F869F6C}" dt="2022-05-11T21:43:28.802" v="138"/>
+        <pc:chgData name="Jonathan Mah" userId="5261b2f2f3e51194" providerId="LiveId" clId="{B3B2E634-BB47-48CF-AE9B-407E2F869F6C}" dt="2022-05-11T22:57:02.211" v="141" actId="1076"/>
         <pc:sldMkLst>
           <pc:docMk/>
           <pc:sldMk cId="2124606747" sldId="401"/>
@@ -195,7 +195,7 @@
           </ac:picMkLst>
         </pc:picChg>
         <pc:picChg chg="add mod">
-          <ac:chgData name="Jonathan Mah" userId="5261b2f2f3e51194" providerId="LiveId" clId="{B3B2E634-BB47-48CF-AE9B-407E2F869F6C}" dt="2022-05-11T21:43:28.802" v="138"/>
+          <ac:chgData name="Jonathan Mah" userId="5261b2f2f3e51194" providerId="LiveId" clId="{B3B2E634-BB47-48CF-AE9B-407E2F869F6C}" dt="2022-05-11T22:57:02.211" v="141" actId="1076"/>
           <ac:picMkLst>
             <pc:docMk/>
             <pc:sldMk cId="2124606747" sldId="401"/>
@@ -4437,7 +4437,7 @@
         </p:blipFill>
         <p:spPr bwMode="auto">
           <a:xfrm>
-            <a:off x="1907212" y="1825625"/>
+            <a:off x="1907212" y="1690688"/>
             <a:ext cx="8377575" cy="4351338"/>
           </a:xfrm>
           <a:prstGeom prst="rect">

</xml_diff>

<commit_message>
compute_downsampled_sfs.py and bash script.
</commit_message>
<xml_diff>
--- a/Summary/20220511_microbiome_demographic_slides.pptx
+++ b/Summary/20220511_microbiome_demographic_slides.pptx
@@ -135,7 +135,7 @@
 <file path=ppt/revisionInfo.xml><?xml version="1.0" encoding="utf-8"?>
 <p1510:revInfo xmlns:a="http://schemas.openxmlformats.org/drawingml/2006/main" xmlns:r="http://schemas.openxmlformats.org/officeDocument/2006/relationships" xmlns:p1510="http://schemas.microsoft.com/office/powerpoint/2015/10/main">
   <p1510:revLst>
-    <p1510:client id="{B3B2E634-BB47-48CF-AE9B-407E2F869F6C}" v="5" dt="2022-05-11T21:43:28.802"/>
+    <p1510:client id="{B3B2E634-BB47-48CF-AE9B-407E2F869F6C}" v="10" dt="2022-05-13T18:26:24.308"/>
   </p1510:revLst>
 </p1510:revInfo>
 </file>
@@ -145,18 +145,18 @@
   <pc:docChgLst>
     <pc:chgData name="Jonathan Mah" userId="5261b2f2f3e51194" providerId="LiveId" clId="{B3B2E634-BB47-48CF-AE9B-407E2F869F6C}"/>
     <pc:docChg chg="custSel addSld delSld modSld modSection">
-      <pc:chgData name="Jonathan Mah" userId="5261b2f2f3e51194" providerId="LiveId" clId="{B3B2E634-BB47-48CF-AE9B-407E2F869F6C}" dt="2022-05-11T22:57:02.211" v="141" actId="1076"/>
+      <pc:chgData name="Jonathan Mah" userId="5261b2f2f3e51194" providerId="LiveId" clId="{B3B2E634-BB47-48CF-AE9B-407E2F869F6C}" dt="2022-05-13T18:27:16.678" v="396" actId="20577"/>
       <pc:docMkLst>
         <pc:docMk/>
       </pc:docMkLst>
       <pc:sldChg chg="modSp mod">
-        <pc:chgData name="Jonathan Mah" userId="5261b2f2f3e51194" providerId="LiveId" clId="{B3B2E634-BB47-48CF-AE9B-407E2F869F6C}" dt="2022-05-11T21:43:06.818" v="121" actId="20577"/>
+        <pc:chgData name="Jonathan Mah" userId="5261b2f2f3e51194" providerId="LiveId" clId="{B3B2E634-BB47-48CF-AE9B-407E2F869F6C}" dt="2022-05-13T18:26:41.930" v="216" actId="20577"/>
         <pc:sldMkLst>
           <pc:docMk/>
           <pc:sldMk cId="2977728054" sldId="366"/>
         </pc:sldMkLst>
         <pc:spChg chg="mod">
-          <ac:chgData name="Jonathan Mah" userId="5261b2f2f3e51194" providerId="LiveId" clId="{B3B2E634-BB47-48CF-AE9B-407E2F869F6C}" dt="2022-05-11T21:43:06.818" v="121" actId="20577"/>
+          <ac:chgData name="Jonathan Mah" userId="5261b2f2f3e51194" providerId="LiveId" clId="{B3B2E634-BB47-48CF-AE9B-407E2F869F6C}" dt="2022-05-13T18:26:41.930" v="216" actId="20577"/>
           <ac:spMkLst>
             <pc:docMk/>
             <pc:sldMk cId="2977728054" sldId="366"/>
@@ -164,8 +164,38 @@
           </ac:spMkLst>
         </pc:spChg>
       </pc:sldChg>
+      <pc:sldChg chg="modSp mod">
+        <pc:chgData name="Jonathan Mah" userId="5261b2f2f3e51194" providerId="LiveId" clId="{B3B2E634-BB47-48CF-AE9B-407E2F869F6C}" dt="2022-05-13T18:27:11.334" v="395" actId="20577"/>
+        <pc:sldMkLst>
+          <pc:docMk/>
+          <pc:sldMk cId="2533509981" sldId="399"/>
+        </pc:sldMkLst>
+        <pc:spChg chg="mod">
+          <ac:chgData name="Jonathan Mah" userId="5261b2f2f3e51194" providerId="LiveId" clId="{B3B2E634-BB47-48CF-AE9B-407E2F869F6C}" dt="2022-05-13T18:27:11.334" v="395" actId="20577"/>
+          <ac:spMkLst>
+            <pc:docMk/>
+            <pc:sldMk cId="2533509981" sldId="399"/>
+            <ac:spMk id="3" creationId="{AADD84A0-4056-4C50-9D26-2BA6AE9D454C}"/>
+          </ac:spMkLst>
+        </pc:spChg>
+      </pc:sldChg>
+      <pc:sldChg chg="modSp mod">
+        <pc:chgData name="Jonathan Mah" userId="5261b2f2f3e51194" providerId="LiveId" clId="{B3B2E634-BB47-48CF-AE9B-407E2F869F6C}" dt="2022-05-13T18:27:16.678" v="396" actId="20577"/>
+        <pc:sldMkLst>
+          <pc:docMk/>
+          <pc:sldMk cId="107190669" sldId="400"/>
+        </pc:sldMkLst>
+        <pc:spChg chg="mod">
+          <ac:chgData name="Jonathan Mah" userId="5261b2f2f3e51194" providerId="LiveId" clId="{B3B2E634-BB47-48CF-AE9B-407E2F869F6C}" dt="2022-05-13T18:27:16.678" v="396" actId="20577"/>
+          <ac:spMkLst>
+            <pc:docMk/>
+            <pc:sldMk cId="107190669" sldId="400"/>
+            <ac:spMk id="3" creationId="{AADD84A0-4056-4C50-9D26-2BA6AE9D454C}"/>
+          </ac:spMkLst>
+        </pc:spChg>
+      </pc:sldChg>
       <pc:sldChg chg="addSp delSp modSp add mod">
-        <pc:chgData name="Jonathan Mah" userId="5261b2f2f3e51194" providerId="LiveId" clId="{B3B2E634-BB47-48CF-AE9B-407E2F869F6C}" dt="2022-05-11T22:57:02.211" v="141" actId="1076"/>
+        <pc:chgData name="Jonathan Mah" userId="5261b2f2f3e51194" providerId="LiveId" clId="{B3B2E634-BB47-48CF-AE9B-407E2F869F6C}" dt="2022-05-13T18:26:29.242" v="150" actId="1076"/>
         <pc:sldMkLst>
           <pc:docMk/>
           <pc:sldMk cId="2124606747" sldId="401"/>
@@ -186,6 +216,22 @@
             <ac:spMk id="3" creationId="{0185D601-86C1-40AA-B68A-90906EDD42C9}"/>
           </ac:spMkLst>
         </pc:spChg>
+        <pc:spChg chg="add del mod">
+          <ac:chgData name="Jonathan Mah" userId="5261b2f2f3e51194" providerId="LiveId" clId="{B3B2E634-BB47-48CF-AE9B-407E2F869F6C}" dt="2022-05-13T18:26:24.308" v="147"/>
+          <ac:spMkLst>
+            <pc:docMk/>
+            <pc:sldMk cId="2124606747" sldId="401"/>
+            <ac:spMk id="4" creationId="{93A86BC6-82F7-A4E0-E1CB-C78BB0F22174}"/>
+          </ac:spMkLst>
+        </pc:spChg>
+        <pc:spChg chg="add del mod">
+          <ac:chgData name="Jonathan Mah" userId="5261b2f2f3e51194" providerId="LiveId" clId="{B3B2E634-BB47-48CF-AE9B-407E2F869F6C}" dt="2022-05-13T18:26:24.277" v="146"/>
+          <ac:spMkLst>
+            <pc:docMk/>
+            <pc:sldMk cId="2124606747" sldId="401"/>
+            <ac:spMk id="6" creationId="{63A18DA2-58EA-EAEF-C785-A8BD37DB43C3}"/>
+          </ac:spMkLst>
+        </pc:spChg>
         <pc:picChg chg="add del mod">
           <ac:chgData name="Jonathan Mah" userId="5261b2f2f3e51194" providerId="LiveId" clId="{B3B2E634-BB47-48CF-AE9B-407E2F869F6C}" dt="2022-05-11T21:43:27.635" v="137" actId="478"/>
           <ac:picMkLst>
@@ -194,12 +240,20 @@
             <ac:picMk id="4" creationId="{4973B868-1AF2-31A5-726A-E446E43134D0}"/>
           </ac:picMkLst>
         </pc:picChg>
-        <pc:picChg chg="add mod">
-          <ac:chgData name="Jonathan Mah" userId="5261b2f2f3e51194" providerId="LiveId" clId="{B3B2E634-BB47-48CF-AE9B-407E2F869F6C}" dt="2022-05-11T22:57:02.211" v="141" actId="1076"/>
+        <pc:picChg chg="add del mod">
+          <ac:chgData name="Jonathan Mah" userId="5261b2f2f3e51194" providerId="LiveId" clId="{B3B2E634-BB47-48CF-AE9B-407E2F869F6C}" dt="2022-05-13T18:26:18.888" v="142" actId="478"/>
           <ac:picMkLst>
             <pc:docMk/>
             <pc:sldMk cId="2124606747" sldId="401"/>
             <ac:picMk id="5" creationId="{3C70F598-927C-CB2E-8DAC-59FFF9D39399}"/>
+          </ac:picMkLst>
+        </pc:picChg>
+        <pc:picChg chg="add mod">
+          <ac:chgData name="Jonathan Mah" userId="5261b2f2f3e51194" providerId="LiveId" clId="{B3B2E634-BB47-48CF-AE9B-407E2F869F6C}" dt="2022-05-13T18:26:29.242" v="150" actId="1076"/>
+          <ac:picMkLst>
+            <pc:docMk/>
+            <pc:sldMk cId="2124606747" sldId="401"/>
+            <ac:picMk id="7" creationId="{4EB0EDA2-6596-8DB8-3CCC-678078A17F86}"/>
           </ac:picMkLst>
         </pc:picChg>
       </pc:sldChg>
@@ -651,7 +705,7 @@
           <a:p>
             <a:fld id="{2F446724-7A58-4020-9182-8374F0305DD3}" type="datetimeFigureOut">
               <a:rPr lang="en-US" smtClean="0"/>
-              <a:t>5/11/2022</a:t>
+              <a:t>5/13/2022</a:t>
             </a:fld>
             <a:endParaRPr lang="en-US"/>
           </a:p>
@@ -1065,7 +1119,7 @@
           <a:p>
             <a:fld id="{6A6E4237-9E27-40CF-A4D8-1330F92F21DA}" type="datetimeFigureOut">
               <a:rPr lang="en-US" smtClean="0"/>
-              <a:t>5/11/2022</a:t>
+              <a:t>5/13/2022</a:t>
             </a:fld>
             <a:endParaRPr lang="en-US"/>
           </a:p>
@@ -1263,7 +1317,7 @@
           <a:p>
             <a:fld id="{6A6E4237-9E27-40CF-A4D8-1330F92F21DA}" type="datetimeFigureOut">
               <a:rPr lang="en-US" smtClean="0"/>
-              <a:t>5/11/2022</a:t>
+              <a:t>5/13/2022</a:t>
             </a:fld>
             <a:endParaRPr lang="en-US"/>
           </a:p>
@@ -1471,7 +1525,7 @@
           <a:p>
             <a:fld id="{6A6E4237-9E27-40CF-A4D8-1330F92F21DA}" type="datetimeFigureOut">
               <a:rPr lang="en-US" smtClean="0"/>
-              <a:t>5/11/2022</a:t>
+              <a:t>5/13/2022</a:t>
             </a:fld>
             <a:endParaRPr lang="en-US"/>
           </a:p>
@@ -1669,7 +1723,7 @@
           <a:p>
             <a:fld id="{6A6E4237-9E27-40CF-A4D8-1330F92F21DA}" type="datetimeFigureOut">
               <a:rPr lang="en-US" smtClean="0"/>
-              <a:t>5/11/2022</a:t>
+              <a:t>5/13/2022</a:t>
             </a:fld>
             <a:endParaRPr lang="en-US"/>
           </a:p>
@@ -1944,7 +1998,7 @@
           <a:p>
             <a:fld id="{6A6E4237-9E27-40CF-A4D8-1330F92F21DA}" type="datetimeFigureOut">
               <a:rPr lang="en-US" smtClean="0"/>
-              <a:t>5/11/2022</a:t>
+              <a:t>5/13/2022</a:t>
             </a:fld>
             <a:endParaRPr lang="en-US"/>
           </a:p>
@@ -2209,7 +2263,7 @@
           <a:p>
             <a:fld id="{6A6E4237-9E27-40CF-A4D8-1330F92F21DA}" type="datetimeFigureOut">
               <a:rPr lang="en-US" smtClean="0"/>
-              <a:t>5/11/2022</a:t>
+              <a:t>5/13/2022</a:t>
             </a:fld>
             <a:endParaRPr lang="en-US"/>
           </a:p>
@@ -2621,7 +2675,7 @@
           <a:p>
             <a:fld id="{6A6E4237-9E27-40CF-A4D8-1330F92F21DA}" type="datetimeFigureOut">
               <a:rPr lang="en-US" smtClean="0"/>
-              <a:t>5/11/2022</a:t>
+              <a:t>5/13/2022</a:t>
             </a:fld>
             <a:endParaRPr lang="en-US"/>
           </a:p>
@@ -2762,7 +2816,7 @@
           <a:p>
             <a:fld id="{6A6E4237-9E27-40CF-A4D8-1330F92F21DA}" type="datetimeFigureOut">
               <a:rPr lang="en-US" smtClean="0"/>
-              <a:t>5/11/2022</a:t>
+              <a:t>5/13/2022</a:t>
             </a:fld>
             <a:endParaRPr lang="en-US"/>
           </a:p>
@@ -2875,7 +2929,7 @@
           <a:p>
             <a:fld id="{6A6E4237-9E27-40CF-A4D8-1330F92F21DA}" type="datetimeFigureOut">
               <a:rPr lang="en-US" smtClean="0"/>
-              <a:t>5/11/2022</a:t>
+              <a:t>5/13/2022</a:t>
             </a:fld>
             <a:endParaRPr lang="en-US"/>
           </a:p>
@@ -3186,7 +3240,7 @@
           <a:p>
             <a:fld id="{6A6E4237-9E27-40CF-A4D8-1330F92F21DA}" type="datetimeFigureOut">
               <a:rPr lang="en-US" smtClean="0"/>
-              <a:t>5/11/2022</a:t>
+              <a:t>5/13/2022</a:t>
             </a:fld>
             <a:endParaRPr lang="en-US"/>
           </a:p>
@@ -3474,7 +3528,7 @@
           <a:p>
             <a:fld id="{6A6E4237-9E27-40CF-A4D8-1330F92F21DA}" type="datetimeFigureOut">
               <a:rPr lang="en-US" smtClean="0"/>
-              <a:t>5/11/2022</a:t>
+              <a:t>5/13/2022</a:t>
             </a:fld>
             <a:endParaRPr lang="en-US"/>
           </a:p>
@@ -3715,7 +3769,7 @@
           <a:p>
             <a:fld id="{6A6E4237-9E27-40CF-A4D8-1330F92F21DA}" type="datetimeFigureOut">
               <a:rPr lang="en-US" smtClean="0"/>
-              <a:t>5/11/2022</a:t>
+              <a:t>5/13/2022</a:t>
             </a:fld>
             <a:endParaRPr lang="en-US"/>
           </a:p>
@@ -4297,7 +4351,7 @@
           <a:lstStyle/>
           <a:p>
             <a:r>
-              <a:rPr lang="en-US">
+              <a:rPr lang="en-US" dirty="0">
                 <a:latin typeface="Yu Gothic" panose="020B0400000000000000" pitchFamily="34" charset="-128"/>
                 <a:ea typeface="Yu Gothic" panose="020B0400000000000000" pitchFamily="34" charset="-128"/>
               </a:rPr>
@@ -4335,6 +4389,24 @@
                 <a:ea typeface="Yu Gothic" panose="020B0400000000000000" pitchFamily="34" charset="-128"/>
               </a:rPr>
               <a:t>Comparing rho (recombination) vs. mu (mutation rate) and increase in log likelihood.</a:t>
+            </a:r>
+          </a:p>
+          <a:p>
+            <a:r>
+              <a:rPr lang="en-US" dirty="0">
+                <a:latin typeface="Yu Gothic" panose="020B0400000000000000" pitchFamily="34" charset="-128"/>
+                <a:ea typeface="Yu Gothic" panose="020B0400000000000000" pitchFamily="34" charset="-128"/>
+              </a:rPr>
+              <a:t>Model outputs</a:t>
+            </a:r>
+          </a:p>
+          <a:p>
+            <a:r>
+              <a:rPr lang="en-US" dirty="0">
+                <a:latin typeface="Yu Gothic" panose="020B0400000000000000" pitchFamily="34" charset="-128"/>
+                <a:ea typeface="Yu Gothic" panose="020B0400000000000000" pitchFamily="34" charset="-128"/>
+              </a:rPr>
+              <a:t>Some literature review = thoughts</a:t>
             </a:r>
           </a:p>
           <a:p>
@@ -4408,10 +4480,10 @@
       </p:sp>
       <p:pic>
         <p:nvPicPr>
-          <p:cNvPr id="5" name="Content Placeholder 4">
-            <a:extLst>
-              <a:ext uri="{FF2B5EF4-FFF2-40B4-BE49-F238E27FC236}">
-                <a16:creationId xmlns:a16="http://schemas.microsoft.com/office/drawing/2014/main" id="{3C70F598-927C-CB2E-8DAC-59FFF9D39399}"/>
+          <p:cNvPr id="7" name="Content Placeholder 6">
+            <a:extLst>
+              <a:ext uri="{FF2B5EF4-FFF2-40B4-BE49-F238E27FC236}">
+                <a16:creationId xmlns:a16="http://schemas.microsoft.com/office/drawing/2014/main" id="{4EB0EDA2-6596-8DB8-3CCC-678078A17F86}"/>
               </a:ext>
             </a:extLst>
           </p:cNvPr>
@@ -4423,30 +4495,19 @@
           </p:nvPr>
         </p:nvPicPr>
         <p:blipFill>
-          <a:blip r:embed="rId2">
-            <a:extLst>
-              <a:ext uri="{28A0092B-C50C-407E-A947-70E740481C1C}">
-                <a14:useLocalDpi xmlns:a14="http://schemas.microsoft.com/office/drawing/2010/main" val="0"/>
-              </a:ext>
-            </a:extLst>
-          </a:blip>
-          <a:srcRect/>
+          <a:blip r:embed="rId2"/>
           <a:stretch>
             <a:fillRect/>
           </a:stretch>
         </p:blipFill>
-        <p:spPr bwMode="auto">
+        <p:spPr>
           <a:xfrm>
-            <a:off x="1907212" y="1690688"/>
-            <a:ext cx="8377575" cy="4351338"/>
+            <a:off x="2171620" y="1460518"/>
+            <a:ext cx="7848760" cy="5032357"/>
           </a:xfrm>
           <a:prstGeom prst="rect">
             <a:avLst/>
           </a:prstGeom>
-          <a:noFill/>
-          <a:ln>
-            <a:noFill/>
-          </a:ln>
         </p:spPr>
       </p:pic>
     </p:spTree>
@@ -4526,65 +4587,13 @@
         <p:spPr/>
         <p:txBody>
           <a:bodyPr>
-            <a:normAutofit lnSpcReduction="10000"/>
+            <a:normAutofit/>
           </a:bodyPr>
           <a:lstStyle/>
           <a:p>
-            <a:endParaRPr lang="en-US" dirty="0"/>
-          </a:p>
-          <a:p>
             <a:r>
               <a:rPr lang="en-US" dirty="0"/>
-              <a:t>Synonymous and </a:t>
-            </a:r>
-            <a:r>
-              <a:rPr lang="en-US" dirty="0" err="1"/>
-              <a:t>Nonsynomous</a:t>
-            </a:r>
-            <a:r>
-              <a:rPr lang="en-US" dirty="0"/>
-              <a:t> </a:t>
-            </a:r>
-            <a:r>
-              <a:rPr lang="en-US" dirty="0" err="1"/>
-              <a:t>sfs’s</a:t>
-            </a:r>
-            <a:r>
-              <a:rPr lang="en-US" dirty="0"/>
-              <a:t> differ</a:t>
-            </a:r>
-          </a:p>
-          <a:p>
-            <a:r>
-              <a:rPr lang="en-US" dirty="0"/>
-              <a:t>Model </a:t>
-            </a:r>
-            <a:r>
-              <a:rPr lang="en-US" dirty="0" err="1"/>
-              <a:t>sfs’s</a:t>
-            </a:r>
-            <a:r>
-              <a:rPr lang="en-US" dirty="0"/>
-              <a:t> (either for demography or for DFE) differ less (as best I can tell)</a:t>
-            </a:r>
-          </a:p>
-          <a:p>
-            <a:r>
-              <a:rPr lang="en-US" dirty="0"/>
-              <a:t>Synonymous to Demography has better fit than Nonsynonymous to DFE</a:t>
-            </a:r>
-          </a:p>
-          <a:p>
-            <a:pPr lvl="1"/>
-            <a:r>
-              <a:rPr lang="en-US" dirty="0"/>
-              <a:t>There might be a systematic weakness in our inference and fitting – I am not sure why.</a:t>
-            </a:r>
-          </a:p>
-          <a:p>
-            <a:r>
-              <a:rPr lang="en-US" dirty="0"/>
-              <a:t>DFE inferences in general are pretty close to each other in microbiome</a:t>
+              <a:t>The demographic models which were significant all have a low rho/mu ratio, which is not promising.</a:t>
             </a:r>
           </a:p>
         </p:txBody>
@@ -4670,32 +4679,6 @@
           </a:bodyPr>
           <a:lstStyle/>
           <a:p>
-            <a:r>
-              <a:rPr lang="en-US" dirty="0"/>
-              <a:t>species prevalence figure</a:t>
-            </a:r>
-          </a:p>
-          <a:p>
-            <a:r>
-              <a:rPr lang="en-US" dirty="0"/>
-              <a:t>data export script</a:t>
-            </a:r>
-          </a:p>
-          <a:p>
-            <a:r>
-              <a:rPr lang="en-US" dirty="0"/>
-              <a:t>writing</a:t>
-            </a:r>
-          </a:p>
-          <a:p>
-            <a:r>
-              <a:rPr lang="en-US" dirty="0" err="1"/>
-              <a:t>midas</a:t>
-            </a:r>
-            <a:r>
-              <a:rPr lang="en-US"/>
-              <a:t> merge</a:t>
-            </a:r>
             <a:endParaRPr lang="en-US" dirty="0"/>
           </a:p>
         </p:txBody>

</xml_diff>